<commit_message>
increase record time | initConst doesn't depend on initPsy
</commit_message>
<xml_diff>
--- a/presentation/subliminal priming w motion capture.pptx
+++ b/presentation/subliminal priming w motion capture.pptx
@@ -215,7 +215,7 @@
           <a:p>
             <a:fld id="{570F9A4C-81B4-4F82-8E79-E7D7AE6D8BDE}" type="datetimeFigureOut">
               <a:rPr lang="he-IL" smtClean="0"/>
-              <a:t>י"ח/אדר/תשפ"א</a:t>
+              <a:t>כ"ג/אדר/תשפ"א</a:t>
             </a:fld>
             <a:endParaRPr lang="he-IL"/>
           </a:p>
@@ -1463,7 +1463,7 @@
           <a:p>
             <a:fld id="{69DAF226-170E-4775-BBBE-354FFF534133}" type="datetimeFigureOut">
               <a:rPr lang="he-IL" smtClean="0"/>
-              <a:t>י"ח/אדר/תשפ"א</a:t>
+              <a:t>כ"ג/אדר/תשפ"א</a:t>
             </a:fld>
             <a:endParaRPr lang="he-IL"/>
           </a:p>
@@ -1663,7 +1663,7 @@
           <a:p>
             <a:fld id="{69DAF226-170E-4775-BBBE-354FFF534133}" type="datetimeFigureOut">
               <a:rPr lang="he-IL" smtClean="0"/>
-              <a:t>י"ח/אדר/תשפ"א</a:t>
+              <a:t>כ"ג/אדר/תשפ"א</a:t>
             </a:fld>
             <a:endParaRPr lang="he-IL"/>
           </a:p>
@@ -1873,7 +1873,7 @@
           <a:p>
             <a:fld id="{69DAF226-170E-4775-BBBE-354FFF534133}" type="datetimeFigureOut">
               <a:rPr lang="he-IL" smtClean="0"/>
-              <a:t>י"ח/אדר/תשפ"א</a:t>
+              <a:t>כ"ג/אדר/תשפ"א</a:t>
             </a:fld>
             <a:endParaRPr lang="he-IL"/>
           </a:p>
@@ -2073,7 +2073,7 @@
           <a:p>
             <a:fld id="{69DAF226-170E-4775-BBBE-354FFF534133}" type="datetimeFigureOut">
               <a:rPr lang="he-IL" smtClean="0"/>
-              <a:t>י"ח/אדר/תשפ"א</a:t>
+              <a:t>כ"ג/אדר/תשפ"א</a:t>
             </a:fld>
             <a:endParaRPr lang="he-IL"/>
           </a:p>
@@ -2349,7 +2349,7 @@
           <a:p>
             <a:fld id="{69DAF226-170E-4775-BBBE-354FFF534133}" type="datetimeFigureOut">
               <a:rPr lang="he-IL" smtClean="0"/>
-              <a:t>י"ח/אדר/תשפ"א</a:t>
+              <a:t>כ"ג/אדר/תשפ"א</a:t>
             </a:fld>
             <a:endParaRPr lang="he-IL"/>
           </a:p>
@@ -2617,7 +2617,7 @@
           <a:p>
             <a:fld id="{69DAF226-170E-4775-BBBE-354FFF534133}" type="datetimeFigureOut">
               <a:rPr lang="he-IL" smtClean="0"/>
-              <a:t>י"ח/אדר/תשפ"א</a:t>
+              <a:t>כ"ג/אדר/תשפ"א</a:t>
             </a:fld>
             <a:endParaRPr lang="he-IL"/>
           </a:p>
@@ -3032,7 +3032,7 @@
           <a:p>
             <a:fld id="{69DAF226-170E-4775-BBBE-354FFF534133}" type="datetimeFigureOut">
               <a:rPr lang="he-IL" smtClean="0"/>
-              <a:t>י"ח/אדר/תשפ"א</a:t>
+              <a:t>כ"ג/אדר/תשפ"א</a:t>
             </a:fld>
             <a:endParaRPr lang="he-IL"/>
           </a:p>
@@ -3174,7 +3174,7 @@
           <a:p>
             <a:fld id="{69DAF226-170E-4775-BBBE-354FFF534133}" type="datetimeFigureOut">
               <a:rPr lang="he-IL" smtClean="0"/>
-              <a:t>י"ח/אדר/תשפ"א</a:t>
+              <a:t>כ"ג/אדר/תשפ"א</a:t>
             </a:fld>
             <a:endParaRPr lang="he-IL"/>
           </a:p>
@@ -3287,7 +3287,7 @@
           <a:p>
             <a:fld id="{69DAF226-170E-4775-BBBE-354FFF534133}" type="datetimeFigureOut">
               <a:rPr lang="he-IL" smtClean="0"/>
-              <a:t>י"ח/אדר/תשפ"א</a:t>
+              <a:t>כ"ג/אדר/תשפ"א</a:t>
             </a:fld>
             <a:endParaRPr lang="he-IL"/>
           </a:p>
@@ -3600,7 +3600,7 @@
           <a:p>
             <a:fld id="{69DAF226-170E-4775-BBBE-354FFF534133}" type="datetimeFigureOut">
               <a:rPr lang="he-IL" smtClean="0"/>
-              <a:t>י"ח/אדר/תשפ"א</a:t>
+              <a:t>כ"ג/אדר/תשפ"א</a:t>
             </a:fld>
             <a:endParaRPr lang="he-IL"/>
           </a:p>
@@ -3889,7 +3889,7 @@
           <a:p>
             <a:fld id="{69DAF226-170E-4775-BBBE-354FFF534133}" type="datetimeFigureOut">
               <a:rPr lang="he-IL" smtClean="0"/>
-              <a:t>י"ח/אדר/תשפ"א</a:t>
+              <a:t>כ"ג/אדר/תשפ"א</a:t>
             </a:fld>
             <a:endParaRPr lang="he-IL"/>
           </a:p>
@@ -4132,7 +4132,7 @@
           <a:p>
             <a:fld id="{69DAF226-170E-4775-BBBE-354FFF534133}" type="datetimeFigureOut">
               <a:rPr lang="he-IL" smtClean="0"/>
-              <a:t>י"ח/אדר/תשפ"א</a:t>
+              <a:t>כ"ג/אדר/תשפ"א</a:t>
             </a:fld>
             <a:endParaRPr lang="he-IL"/>
           </a:p>
@@ -4909,8 +4909,8 @@
           </p:txBody>
         </p:sp>
       </p:grpSp>
-      <mc:AlternateContent xmlns:mc="http://schemas.openxmlformats.org/markup-compatibility/2006">
-        <mc:Choice xmlns:a14="http://schemas.microsoft.com/office/drawing/2010/main" Requires="a14">
+      <mc:AlternateContent xmlns:mc="http://schemas.openxmlformats.org/markup-compatibility/2006" xmlns:a14="http://schemas.microsoft.com/office/drawing/2010/main">
+        <mc:Choice Requires="a14">
           <p:sp>
             <p:nvSpPr>
               <p:cNvPr id="9" name="TextBox 8">
@@ -5017,7 +5017,7 @@
             </p:txBody>
           </p:sp>
         </mc:Choice>
-        <mc:Fallback>
+        <mc:Fallback xmlns="">
           <p:sp>
             <p:nvSpPr>
               <p:cNvPr id="9" name="TextBox 8">

</xml_diff>